<commit_message>
added stuff to gitignore
</commit_message>
<xml_diff>
--- a/Introduction_Framework_Overview_1.pptx
+++ b/Introduction_Framework_Overview_1.pptx
@@ -296,7 +296,7 @@
               <a:pPr>
                 <a:defRPr/>
               </a:pPr>
-              <a:t>1/20/2022</a:t>
+              <a:t>1/14/2025</a:t>
             </a:fld>
             <a:endParaRPr lang="en-US"/>
           </a:p>
@@ -523,7 +523,7 @@
               <a:pPr>
                 <a:defRPr/>
               </a:pPr>
-              <a:t>1/20/2022</a:t>
+              <a:t>1/14/2025</a:t>
             </a:fld>
             <a:endParaRPr lang="en-US"/>
           </a:p>
@@ -3562,7 +3562,7 @@
           <a:p>
             <a:fld id="{04C01D68-98F0-4413-A543-950947CC53F4}" type="datetime1">
               <a:rPr lang="en-US" smtClean="0"/>
-              <a:t>1/20/2022</a:t>
+              <a:t>1/14/2025</a:t>
             </a:fld>
             <a:endParaRPr lang="en-US"/>
           </a:p>
@@ -3732,7 +3732,7 @@
           <a:p>
             <a:fld id="{C764DE79-268F-4C1A-8933-263129D2AF90}" type="datetimeFigureOut">
               <a:rPr lang="en-US" dirty="0"/>
-              <a:t>1/20/2022</a:t>
+              <a:t>1/14/2025</a:t>
             </a:fld>
             <a:endParaRPr lang="en-US" dirty="0"/>
           </a:p>
@@ -4143,7 +4143,7 @@
           <a:p>
             <a:fld id="{FDB3EDF1-F613-4DA2-A80A-754A6940B2FC}" type="datetime1">
               <a:rPr lang="en-US" smtClean="0"/>
-              <a:t>1/20/2022</a:t>
+              <a:t>1/14/2025</a:t>
             </a:fld>
             <a:endParaRPr lang="en-US"/>
           </a:p>
@@ -4375,7 +4375,7 @@
           <a:p>
             <a:fld id="{FD3B0033-72B4-4535-88FF-3AD028C99723}" type="datetime1">
               <a:rPr lang="en-US" smtClean="0"/>
-              <a:t>1/20/2022</a:t>
+              <a:t>1/14/2025</a:t>
             </a:fld>
             <a:endParaRPr lang="en-US"/>
           </a:p>
@@ -4742,7 +4742,7 @@
           <a:p>
             <a:fld id="{96B2EC89-E834-484E-B15B-8A782CBE7E42}" type="datetime1">
               <a:rPr lang="en-US" smtClean="0"/>
-              <a:t>1/20/2022</a:t>
+              <a:t>1/14/2025</a:t>
             </a:fld>
             <a:endParaRPr lang="en-US"/>
           </a:p>
@@ -4860,7 +4860,7 @@
           <a:p>
             <a:fld id="{B0BFDB64-FBD6-4851-B5A5-2376FDD55407}" type="datetime1">
               <a:rPr lang="en-US" smtClean="0"/>
-              <a:t>1/20/2022</a:t>
+              <a:t>1/14/2025</a:t>
             </a:fld>
             <a:endParaRPr lang="en-US"/>
           </a:p>
@@ -4955,7 +4955,7 @@
           <a:p>
             <a:fld id="{A796691A-4010-4E41-AAA5-8BA8423BEAFA}" type="datetime1">
               <a:rPr lang="en-US" smtClean="0"/>
-              <a:t>1/20/2022</a:t>
+              <a:t>1/14/2025</a:t>
             </a:fld>
             <a:endParaRPr lang="en-US"/>
           </a:p>
@@ -5232,7 +5232,7 @@
           <a:p>
             <a:fld id="{19A26292-8CED-46F0-BBB1-1BA0D2A33D09}" type="datetime1">
               <a:rPr lang="en-US" smtClean="0"/>
-              <a:t>1/20/2022</a:t>
+              <a:t>1/14/2025</a:t>
             </a:fld>
             <a:endParaRPr lang="en-US"/>
           </a:p>
@@ -5489,7 +5489,7 @@
           <a:p>
             <a:fld id="{961AD9AB-7BFD-44AF-B1FE-05602162B8C3}" type="datetime1">
               <a:rPr lang="en-US" smtClean="0"/>
-              <a:t>1/20/2022</a:t>
+              <a:t>1/14/2025</a:t>
             </a:fld>
             <a:endParaRPr lang="en-US"/>
           </a:p>
@@ -5659,7 +5659,7 @@
           <a:p>
             <a:fld id="{F5166586-FB24-4278-9591-82C4BBCDCA89}" type="datetime1">
               <a:rPr lang="en-US" smtClean="0"/>
-              <a:t>1/20/2022</a:t>
+              <a:t>1/14/2025</a:t>
             </a:fld>
             <a:endParaRPr lang="en-US"/>
           </a:p>
@@ -5839,7 +5839,7 @@
           <a:p>
             <a:fld id="{D5A5CA0D-3537-42D6-B0CE-3FBC0D012150}" type="datetime1">
               <a:rPr lang="en-US" smtClean="0"/>
-              <a:t>1/20/2022</a:t>
+              <a:t>1/14/2025</a:t>
             </a:fld>
             <a:endParaRPr lang="en-US"/>
           </a:p>
@@ -8774,7 +8774,7 @@
             </a:pPr>
             <a:fld id="{10DA1A4F-3D9D-4EC4-B0B1-93E85D9B25FE}" type="datetime1">
               <a:rPr lang="en-US" smtClean="0"/>
-              <a:t>1/20/2022</a:t>
+              <a:t>1/14/2025</a:t>
             </a:fld>
             <a:endParaRPr lang="en-US" dirty="0"/>
           </a:p>
@@ -9401,7 +9401,7 @@
             </a:pPr>
             <a:fld id="{10DA1A4F-3D9D-4EC4-B0B1-93E85D9B25FE}" type="datetime1">
               <a:rPr lang="en-US" smtClean="0"/>
-              <a:t>1/20/2022</a:t>
+              <a:t>1/14/2025</a:t>
             </a:fld>
             <a:endParaRPr lang="en-US" dirty="0"/>
           </a:p>
@@ -9864,42 +9864,6 @@
           </a:p>
         </p:txBody>
       </p:sp>
-      <p:pic>
-        <p:nvPicPr>
-          <p:cNvPr id="5" name="Picture 4" descr="A picture containing drawing, device&#10;&#10;Description automatically generated">
-            <a:extLst>
-              <a:ext uri="{FF2B5EF4-FFF2-40B4-BE49-F238E27FC236}">
-                <a16:creationId xmlns:a16="http://schemas.microsoft.com/office/drawing/2014/main" id="{70AF1181-7012-49F2-A920-08FF36CE4E73}"/>
-              </a:ext>
-            </a:extLst>
-          </p:cNvPr>
-          <p:cNvPicPr>
-            <a:picLocks noChangeAspect="1"/>
-          </p:cNvPicPr>
-          <p:nvPr/>
-        </p:nvPicPr>
-        <p:blipFill>
-          <a:blip r:embed="rId2" cstate="email">
-            <a:extLst>
-              <a:ext uri="{28A0092B-C50C-407E-A947-70E740481C1C}">
-                <a14:useLocalDpi xmlns:a14="http://schemas.microsoft.com/office/drawing/2010/main" val="0"/>
-              </a:ext>
-            </a:extLst>
-          </a:blip>
-          <a:stretch>
-            <a:fillRect/>
-          </a:stretch>
-        </p:blipFill>
-        <p:spPr>
-          <a:xfrm>
-            <a:off x="1562100" y="762000"/>
-            <a:ext cx="9144000" cy="2590800"/>
-          </a:xfrm>
-          <a:prstGeom prst="rect">
-            <a:avLst/>
-          </a:prstGeom>
-        </p:spPr>
-      </p:pic>
       <p:sp>
         <p:nvSpPr>
           <p:cNvPr id="4" name="TextBox 3">
@@ -16240,7 +16204,7 @@
         </p:nvSpPr>
         <p:spPr>
           <a:xfrm>
-            <a:off x="2286001" y="1752600"/>
+            <a:off x="2099085" y="301347"/>
             <a:ext cx="7756263" cy="1143000"/>
           </a:xfrm>
           <a:prstGeom prst="rect">
@@ -16555,6 +16519,192 @@
           </p:spPr>
         </p:pic>
       </p:grpSp>
+      <p:sp>
+        <p:nvSpPr>
+          <p:cNvPr id="2" name="Title 1">
+            <a:extLst>
+              <a:ext uri="{FF2B5EF4-FFF2-40B4-BE49-F238E27FC236}">
+                <a16:creationId xmlns:a16="http://schemas.microsoft.com/office/drawing/2014/main" id="{CB448FA7-187F-D9E4-A8CA-ABBDFCEF10F4}"/>
+              </a:ext>
+            </a:extLst>
+          </p:cNvPr>
+          <p:cNvSpPr txBox="1">
+            <a:spLocks/>
+          </p:cNvSpPr>
+          <p:nvPr/>
+        </p:nvSpPr>
+        <p:spPr>
+          <a:xfrm>
+            <a:off x="965052" y="1974586"/>
+            <a:ext cx="9702948" cy="3278160"/>
+          </a:xfrm>
+          <a:prstGeom prst="rect">
+            <a:avLst/>
+          </a:prstGeom>
+        </p:spPr>
+        <p:txBody>
+          <a:bodyPr/>
+          <a:lstStyle>
+            <a:lvl1pPr algn="ctr" rtl="0" eaLnBrk="1" fontAlgn="base" hangingPunct="1">
+              <a:spcBef>
+                <a:spcPct val="0"/>
+              </a:spcBef>
+              <a:spcAft>
+                <a:spcPct val="0"/>
+              </a:spcAft>
+              <a:defRPr sz="3000" b="1" kern="1200">
+                <a:solidFill>
+                  <a:srgbClr val="002060"/>
+                </a:solidFill>
+                <a:latin typeface="+mj-lt"/>
+                <a:ea typeface="ＭＳ Ｐゴシック" charset="0"/>
+                <a:cs typeface="Aharoni" panose="02010803020104030203" pitchFamily="2" charset="-79"/>
+              </a:defRPr>
+            </a:lvl1pPr>
+            <a:lvl2pPr algn="ctr" rtl="0" eaLnBrk="1" fontAlgn="base" hangingPunct="1">
+              <a:spcBef>
+                <a:spcPct val="0"/>
+              </a:spcBef>
+              <a:spcAft>
+                <a:spcPct val="0"/>
+              </a:spcAft>
+              <a:defRPr sz="5400">
+                <a:solidFill>
+                  <a:schemeClr val="tx2"/>
+                </a:solidFill>
+                <a:latin typeface="Book Antiqua" charset="0"/>
+                <a:ea typeface="ＭＳ Ｐゴシック" charset="0"/>
+                <a:cs typeface="ＭＳ Ｐゴシック" charset="0"/>
+              </a:defRPr>
+            </a:lvl2pPr>
+            <a:lvl3pPr algn="ctr" rtl="0" eaLnBrk="1" fontAlgn="base" hangingPunct="1">
+              <a:spcBef>
+                <a:spcPct val="0"/>
+              </a:spcBef>
+              <a:spcAft>
+                <a:spcPct val="0"/>
+              </a:spcAft>
+              <a:defRPr sz="5400">
+                <a:solidFill>
+                  <a:schemeClr val="tx2"/>
+                </a:solidFill>
+                <a:latin typeface="Book Antiqua" charset="0"/>
+                <a:ea typeface="ＭＳ Ｐゴシック" charset="0"/>
+                <a:cs typeface="ＭＳ Ｐゴシック" charset="0"/>
+              </a:defRPr>
+            </a:lvl3pPr>
+            <a:lvl4pPr algn="ctr" rtl="0" eaLnBrk="1" fontAlgn="base" hangingPunct="1">
+              <a:spcBef>
+                <a:spcPct val="0"/>
+              </a:spcBef>
+              <a:spcAft>
+                <a:spcPct val="0"/>
+              </a:spcAft>
+              <a:defRPr sz="5400">
+                <a:solidFill>
+                  <a:schemeClr val="tx2"/>
+                </a:solidFill>
+                <a:latin typeface="Book Antiqua" charset="0"/>
+                <a:ea typeface="ＭＳ Ｐゴシック" charset="0"/>
+                <a:cs typeface="ＭＳ Ｐゴシック" charset="0"/>
+              </a:defRPr>
+            </a:lvl4pPr>
+            <a:lvl5pPr algn="ctr" rtl="0" eaLnBrk="1" fontAlgn="base" hangingPunct="1">
+              <a:spcBef>
+                <a:spcPct val="0"/>
+              </a:spcBef>
+              <a:spcAft>
+                <a:spcPct val="0"/>
+              </a:spcAft>
+              <a:defRPr sz="5400">
+                <a:solidFill>
+                  <a:schemeClr val="tx2"/>
+                </a:solidFill>
+                <a:latin typeface="Book Antiqua" charset="0"/>
+                <a:ea typeface="ＭＳ Ｐゴシック" charset="0"/>
+                <a:cs typeface="ＭＳ Ｐゴシック" charset="0"/>
+              </a:defRPr>
+            </a:lvl5pPr>
+            <a:lvl6pPr eaLnBrk="1" hangingPunct="1">
+              <a:defRPr>
+                <a:solidFill>
+                  <a:schemeClr val="tx2"/>
+                </a:solidFill>
+              </a:defRPr>
+            </a:lvl6pPr>
+            <a:lvl7pPr eaLnBrk="1" hangingPunct="1">
+              <a:defRPr>
+                <a:solidFill>
+                  <a:schemeClr val="tx2"/>
+                </a:solidFill>
+              </a:defRPr>
+            </a:lvl7pPr>
+            <a:lvl8pPr eaLnBrk="1" hangingPunct="1">
+              <a:defRPr>
+                <a:solidFill>
+                  <a:schemeClr val="tx2"/>
+                </a:solidFill>
+              </a:defRPr>
+            </a:lvl8pPr>
+            <a:lvl9pPr eaLnBrk="1" hangingPunct="1">
+              <a:defRPr>
+                <a:solidFill>
+                  <a:schemeClr val="tx2"/>
+                </a:solidFill>
+              </a:defRPr>
+            </a:lvl9pPr>
+          </a:lstStyle>
+          <a:p>
+            <a:pPr algn="l"/>
+            <a:r>
+              <a:rPr lang="en-US" dirty="0">
+                <a:solidFill>
+                  <a:schemeClr val="tx1"/>
+                </a:solidFill>
+              </a:rPr>
+              <a:t>Systems: Working environment and version control</a:t>
+            </a:r>
+          </a:p>
+          <a:p>
+            <a:pPr algn="l"/>
+            <a:endParaRPr lang="en-US" dirty="0">
+              <a:solidFill>
+                <a:schemeClr val="tx1"/>
+              </a:solidFill>
+            </a:endParaRPr>
+          </a:p>
+          <a:p>
+            <a:pPr algn="l"/>
+            <a:r>
+              <a:rPr lang="en-US" dirty="0">
+                <a:solidFill>
+                  <a:schemeClr val="tx1"/>
+                </a:solidFill>
+              </a:rPr>
+              <a:t>Design: Given presentation at the end of the semester, likely will require you to build a standalone website</a:t>
+            </a:r>
+          </a:p>
+          <a:p>
+            <a:pPr algn="l"/>
+            <a:endParaRPr lang="en-US" dirty="0">
+              <a:solidFill>
+                <a:schemeClr val="tx1"/>
+              </a:solidFill>
+            </a:endParaRPr>
+          </a:p>
+          <a:p>
+            <a:pPr algn="l"/>
+            <a:r>
+              <a:rPr lang="en-US" dirty="0">
+                <a:solidFill>
+                  <a:schemeClr val="tx1"/>
+                </a:solidFill>
+              </a:rPr>
+              <a:t>Value: Going to cover topics related to ethical issues in develop ML solutions </a:t>
+            </a:r>
+          </a:p>
+        </p:txBody>
+      </p:sp>
     </p:spTree>
     <p:extLst>
       <p:ext uri="{BB962C8B-B14F-4D97-AF65-F5344CB8AC3E}">
@@ -16637,7 +16787,7 @@
                 <a:latin typeface="Times New Roman" panose="02020603050405020304" pitchFamily="18" charset="0"/>
                 <a:cs typeface="Times New Roman" panose="02020603050405020304" pitchFamily="18" charset="0"/>
               </a:rPr>
-              <a:t>Assistant Professor</a:t>
+              <a:t>Associate Professor</a:t>
             </a:r>
             <a:br>
               <a:rPr lang="en-US" sz="1900" dirty="0">
@@ -16746,21 +16896,7 @@
                 <a:latin typeface="Times New Roman" panose="02020603050405020304" pitchFamily="18" charset="0"/>
                 <a:cs typeface="Times New Roman" panose="02020603050405020304" pitchFamily="18" charset="0"/>
               </a:rPr>
-              <a:t>Founded(</a:t>
-            </a:r>
-            <a:r>
-              <a:rPr lang="en-US" sz="1900" dirty="0" err="1">
-                <a:latin typeface="Times New Roman" panose="02020603050405020304" pitchFamily="18" charset="0"/>
-                <a:cs typeface="Times New Roman" panose="02020603050405020304" pitchFamily="18" charset="0"/>
-              </a:rPr>
-              <a:t>ing</a:t>
-            </a:r>
-            <a:r>
-              <a:rPr lang="en-US" sz="1900" dirty="0">
-                <a:latin typeface="Times New Roman" panose="02020603050405020304" pitchFamily="18" charset="0"/>
-                <a:cs typeface="Times New Roman" panose="02020603050405020304" pitchFamily="18" charset="0"/>
-              </a:rPr>
-              <a:t>) UVA’s Undergraduate Programs</a:t>
+              <a:t>Founded UVA’s Undergraduate Programs</a:t>
             </a:r>
             <a:br>
               <a:rPr lang="en-US" sz="1900" dirty="0">
@@ -16779,20 +16915,7 @@
                 <a:latin typeface="Times New Roman" panose="02020603050405020304" pitchFamily="18" charset="0"/>
                 <a:cs typeface="Times New Roman" panose="02020603050405020304" pitchFamily="18" charset="0"/>
               </a:rPr>
-              <a:t>Chief Data Scientist – Small Consultancy</a:t>
-            </a:r>
-            <a:br>
-              <a:rPr lang="en-US" sz="1900" dirty="0">
-                <a:latin typeface="Times New Roman" panose="02020603050405020304" pitchFamily="18" charset="0"/>
-                <a:cs typeface="Times New Roman" panose="02020603050405020304" pitchFamily="18" charset="0"/>
-              </a:rPr>
-            </a:br>
-            <a:r>
-              <a:rPr lang="en-US" sz="1900" dirty="0">
-                <a:latin typeface="Times New Roman" panose="02020603050405020304" pitchFamily="18" charset="0"/>
-                <a:cs typeface="Times New Roman" panose="02020603050405020304" pitchFamily="18" charset="0"/>
-              </a:rPr>
-              <a:t>Worked in Defense Consulting for 10 years</a:t>
+              <a:t>DS Labs LLC – Founder (DS Consulting)</a:t>
             </a:r>
             <a:br>
               <a:rPr lang="en-US" sz="1900" dirty="0">
@@ -16811,8 +16934,14 @@
                 <a:latin typeface="Times New Roman" panose="02020603050405020304" pitchFamily="18" charset="0"/>
                 <a:cs typeface="Times New Roman" panose="02020603050405020304" pitchFamily="18" charset="0"/>
               </a:rPr>
-              <a:t>Board Member for DC Data Community – 30k Members</a:t>
-            </a:r>
+              <a:t>Worked in Defense Consulting for 10 years</a:t>
+            </a:r>
+            <a:br>
+              <a:rPr lang="en-US" sz="1900" dirty="0">
+                <a:latin typeface="Times New Roman" panose="02020603050405020304" pitchFamily="18" charset="0"/>
+                <a:cs typeface="Times New Roman" panose="02020603050405020304" pitchFamily="18" charset="0"/>
+              </a:rPr>
+            </a:br>
             <a:br>
               <a:rPr lang="en-US" sz="1900" dirty="0">
                 <a:latin typeface="Times New Roman" panose="02020603050405020304" pitchFamily="18" charset="0"/>
@@ -18351,12 +18480,12 @@
         </p:spPr>
         <p:txBody>
           <a:bodyPr>
-            <a:normAutofit/>
+            <a:normAutofit fontScale="90000"/>
           </a:bodyPr>
           <a:lstStyle/>
           <a:p>
             <a:r>
-              <a:rPr lang="en-US" sz="1800" dirty="0">
+              <a:rPr lang="en-US" sz="2400" dirty="0">
                 <a:solidFill>
                   <a:schemeClr val="accent1">
                     <a:lumMod val="50000"/>
@@ -18368,7 +18497,7 @@
               <a:t>Research Interest: Intersection of Data Science and Education generally</a:t>
             </a:r>
             <a:br>
-              <a:rPr lang="en-US" sz="1800" dirty="0">
+              <a:rPr lang="en-US" sz="2400" dirty="0">
                 <a:solidFill>
                   <a:schemeClr val="accent1">
                     <a:lumMod val="50000"/>
@@ -18379,7 +18508,30 @@
               </a:rPr>
             </a:br>
             <a:br>
-              <a:rPr lang="en-US" sz="1800" dirty="0">
+              <a:rPr lang="en-US" sz="2400" dirty="0">
+                <a:solidFill>
+                  <a:schemeClr val="accent1">
+                    <a:lumMod val="50000"/>
+                  </a:schemeClr>
+                </a:solidFill>
+                <a:latin typeface="Times New Roman" panose="02020603050405020304" pitchFamily="18" charset="0"/>
+                <a:cs typeface="Times New Roman" panose="02020603050405020304" pitchFamily="18" charset="0"/>
+              </a:rPr>
+            </a:br>
+            <a:r>
+              <a:rPr lang="en-US" sz="2400" dirty="0">
+                <a:solidFill>
+                  <a:schemeClr val="accent1">
+                    <a:lumMod val="50000"/>
+                  </a:schemeClr>
+                </a:solidFill>
+                <a:latin typeface="Times New Roman" panose="02020603050405020304" pitchFamily="18" charset="0"/>
+                <a:cs typeface="Times New Roman" panose="02020603050405020304" pitchFamily="18" charset="0"/>
+              </a:rPr>
+              <a:t>Data Science Active Learning Lab</a:t>
+            </a:r>
+            <a:br>
+              <a:rPr lang="en-US" sz="2400" dirty="0">
                 <a:solidFill>
                   <a:schemeClr val="accent1">
                     <a:lumMod val="50000"/>
@@ -18390,7 +18542,7 @@
               </a:rPr>
             </a:br>
             <a:br>
-              <a:rPr lang="en-US" sz="1800" dirty="0">
+              <a:rPr lang="en-US" sz="2400" dirty="0">
                 <a:solidFill>
                   <a:schemeClr val="accent1">
                     <a:lumMod val="50000"/>
@@ -18401,7 +18553,7 @@
               </a:rPr>
             </a:br>
             <a:br>
-              <a:rPr lang="en-US" sz="1800" dirty="0">
+              <a:rPr lang="en-US" sz="2400" dirty="0">
                 <a:solidFill>
                   <a:schemeClr val="accent1">
                     <a:lumMod val="50000"/>
@@ -18412,7 +18564,7 @@
               </a:rPr>
             </a:br>
             <a:br>
-              <a:rPr lang="en-US" sz="1800" dirty="0">
+              <a:rPr lang="en-US" sz="2400" dirty="0">
                 <a:solidFill>
                   <a:schemeClr val="accent1">
                     <a:lumMod val="50000"/>
@@ -18422,7 +18574,7 @@
                 <a:cs typeface="Times New Roman" panose="02020603050405020304" pitchFamily="18" charset="0"/>
               </a:rPr>
             </a:br>
-            <a:endParaRPr lang="en-US" sz="1800" dirty="0">
+            <a:endParaRPr lang="en-US" sz="2400" dirty="0">
               <a:solidFill>
                 <a:schemeClr val="accent1">
                   <a:lumMod val="50000"/>
@@ -18492,7 +18644,7 @@
         </p:blipFill>
         <p:spPr>
           <a:xfrm rot="5400000">
-            <a:off x="7590542" y="571500"/>
+            <a:off x="8648700" y="1630680"/>
             <a:ext cx="3352800" cy="2514600"/>
           </a:xfrm>
           <a:prstGeom prst="rect">
@@ -18502,10 +18654,10 @@
       </p:pic>
       <p:pic>
         <p:nvPicPr>
-          <p:cNvPr id="3" name="Picture 2" descr="A person and two children sitting at a table with a cake&#10;&#10;Description automatically generated with low confidence">
+          <p:cNvPr id="6" name="Picture 5" descr="A group of people posing for a picture&#10;&#10;Description automatically generated">
             <a:extLst>
               <a:ext uri="{FF2B5EF4-FFF2-40B4-BE49-F238E27FC236}">
-                <a16:creationId xmlns:a16="http://schemas.microsoft.com/office/drawing/2014/main" id="{02BDCAC2-A215-448D-AC94-32FC7320DA06}"/>
+                <a16:creationId xmlns:a16="http://schemas.microsoft.com/office/drawing/2014/main" id="{CE33C63C-9A22-CE98-E759-86C940FF6D7B}"/>
               </a:ext>
             </a:extLst>
           </p:cNvPr>
@@ -18528,8 +18680,8 @@
         </p:blipFill>
         <p:spPr>
           <a:xfrm>
-            <a:off x="4700146" y="1600201"/>
-            <a:ext cx="3067050" cy="3869835"/>
+            <a:off x="4572000" y="304800"/>
+            <a:ext cx="3874770" cy="5166360"/>
           </a:xfrm>
           <a:prstGeom prst="rect">
             <a:avLst/>
@@ -18538,10 +18690,10 @@
       </p:pic>
       <p:pic>
         <p:nvPicPr>
-          <p:cNvPr id="5" name="Picture 4" descr="A picture containing little, child, indoor, child&#10;&#10;Description automatically generated">
+          <p:cNvPr id="9" name="Picture 8" descr="Two cats looking out a window&#10;&#10;Description automatically generated">
             <a:extLst>
               <a:ext uri="{FF2B5EF4-FFF2-40B4-BE49-F238E27FC236}">
-                <a16:creationId xmlns:a16="http://schemas.microsoft.com/office/drawing/2014/main" id="{D02F4F92-850A-4A1D-ADA3-7931C6D5D5B7}"/>
+                <a16:creationId xmlns:a16="http://schemas.microsoft.com/office/drawing/2014/main" id="{1D454428-8F9A-E3D9-955F-5CD41EE587D1}"/>
               </a:ext>
             </a:extLst>
           </p:cNvPr>
@@ -18564,8 +18716,8 @@
         </p:blipFill>
         <p:spPr>
           <a:xfrm>
-            <a:off x="1600200" y="76200"/>
-            <a:ext cx="2857500" cy="3810000"/>
+            <a:off x="623920" y="662940"/>
+            <a:ext cx="3337560" cy="4450080"/>
           </a:xfrm>
           <a:prstGeom prst="rect">
             <a:avLst/>
@@ -21890,21 +22042,6 @@
 </file>
 
 <file path=customXml/item1.xml><?xml version="1.0" encoding="utf-8"?>
-<?mso-contentType ?>
-<FormTemplates xmlns="http://schemas.microsoft.com/sharepoint/v3/contenttype/forms">
-  <Display>DocumentLibraryForm</Display>
-  <Edit>DocumentLibraryForm</Edit>
-  <New>DocumentLibraryForm</New>
-</FormTemplates>
-</file>
-
-<file path=customXml/item2.xml><?xml version="1.0" encoding="utf-8"?>
-<p:properties xmlns:p="http://schemas.microsoft.com/office/2006/metadata/properties" xmlns:xsi="http://www.w3.org/2001/XMLSchema-instance" xmlns:pc="http://schemas.microsoft.com/office/infopath/2007/PartnerControls">
-  <documentManagement/>
-</p:properties>
-</file>
-
-<file path=customXml/item3.xml><?xml version="1.0" encoding="utf-8"?>
 <ct:contentTypeSchema xmlns:ct="http://schemas.microsoft.com/office/2006/metadata/contentType" xmlns:ma="http://schemas.microsoft.com/office/2006/metadata/properties/metaAttributes" ct:_="" ma:_="" ma:contentTypeName="Document" ma:contentTypeID="0x010100845CBBF65F9F714BA6B7672F506B2B6E" ma:contentTypeVersion="0" ma:contentTypeDescription="Create a new document." ma:contentTypeScope="" ma:versionID="f9a81982263cf5f09a0f3f49044eb688">
   <xsd:schema xmlns:xsd="http://www.w3.org/2001/XMLSchema" xmlns:xs="http://www.w3.org/2001/XMLSchema" xmlns:p="http://schemas.microsoft.com/office/2006/metadata/properties" targetNamespace="http://schemas.microsoft.com/office/2006/metadata/properties" ma:root="true" ma:fieldsID="43c307ddd8356acff2b962ac28706ca9">
     <xsd:element name="properties">
@@ -22018,10 +22155,33 @@
 </ct:contentTypeSchema>
 </file>
 
+<file path=customXml/item2.xml><?xml version="1.0" encoding="utf-8"?>
+<p:properties xmlns:p="http://schemas.microsoft.com/office/2006/metadata/properties" xmlns:xsi="http://www.w3.org/2001/XMLSchema-instance" xmlns:pc="http://schemas.microsoft.com/office/infopath/2007/PartnerControls">
+  <documentManagement/>
+</p:properties>
+</file>
+
+<file path=customXml/item3.xml><?xml version="1.0" encoding="utf-8"?>
+<?mso-contentType ?>
+<FormTemplates xmlns="http://schemas.microsoft.com/sharepoint/v3/contenttype/forms">
+  <Display>DocumentLibraryForm</Display>
+  <Edit>DocumentLibraryForm</Edit>
+  <New>DocumentLibraryForm</New>
+</FormTemplates>
+</file>
+
 <file path=customXml/itemProps1.xml><?xml version="1.0" encoding="utf-8"?>
-<ds:datastoreItem xmlns:ds="http://schemas.openxmlformats.org/officeDocument/2006/customXml" ds:itemID="{44CBAEA3-3540-4410-A42C-164733B5C169}">
+<ds:datastoreItem xmlns:ds="http://schemas.openxmlformats.org/officeDocument/2006/customXml" ds:itemID="{DE1C1B9A-B966-46DC-B2D8-0A69EF161425}">
   <ds:schemaRefs>
-    <ds:schemaRef ds:uri="http://schemas.microsoft.com/sharepoint/v3/contenttype/forms"/>
+    <ds:schemaRef ds:uri="http://schemas.microsoft.com/office/2006/metadata/contentType"/>
+    <ds:schemaRef ds:uri="http://schemas.microsoft.com/office/2006/metadata/properties/metaAttributes"/>
+    <ds:schemaRef ds:uri="http://www.w3.org/2001/XMLSchema"/>
+    <ds:schemaRef ds:uri="http://schemas.microsoft.com/office/2006/metadata/properties"/>
+    <ds:schemaRef ds:uri="http://schemas.openxmlformats.org/package/2006/metadata/core-properties"/>
+    <ds:schemaRef ds:uri="http://purl.org/dc/elements/1.1/"/>
+    <ds:schemaRef ds:uri="http://purl.org/dc/terms/"/>
+    <ds:schemaRef ds:uri="http://schemas.microsoft.com/internal/obd"/>
+    <ds:schemaRef ds:uri="http://schemas.microsoft.com/office/infopath/2007/PartnerControls"/>
   </ds:schemaRefs>
 </ds:datastoreItem>
 </file>
@@ -22036,17 +22196,9 @@
 </file>
 
 <file path=customXml/itemProps3.xml><?xml version="1.0" encoding="utf-8"?>
-<ds:datastoreItem xmlns:ds="http://schemas.openxmlformats.org/officeDocument/2006/customXml" ds:itemID="{DE1C1B9A-B966-46DC-B2D8-0A69EF161425}">
+<ds:datastoreItem xmlns:ds="http://schemas.openxmlformats.org/officeDocument/2006/customXml" ds:itemID="{44CBAEA3-3540-4410-A42C-164733B5C169}">
   <ds:schemaRefs>
-    <ds:schemaRef ds:uri="http://schemas.microsoft.com/office/2006/metadata/contentType"/>
-    <ds:schemaRef ds:uri="http://schemas.microsoft.com/office/2006/metadata/properties/metaAttributes"/>
-    <ds:schemaRef ds:uri="http://www.w3.org/2001/XMLSchema"/>
-    <ds:schemaRef ds:uri="http://schemas.microsoft.com/office/2006/metadata/properties"/>
-    <ds:schemaRef ds:uri="http://schemas.openxmlformats.org/package/2006/metadata/core-properties"/>
-    <ds:schemaRef ds:uri="http://purl.org/dc/elements/1.1/"/>
-    <ds:schemaRef ds:uri="http://purl.org/dc/terms/"/>
-    <ds:schemaRef ds:uri="http://schemas.microsoft.com/internal/obd"/>
-    <ds:schemaRef ds:uri="http://schemas.microsoft.com/office/infopath/2007/PartnerControls"/>
+    <ds:schemaRef ds:uri="http://schemas.microsoft.com/sharepoint/v3/contenttype/forms"/>
   </ds:schemaRefs>
 </ds:datastoreItem>
 </file>
</xml_diff>